<commit_message>
added excel sheet for marksheet which is completed
</commit_message>
<xml_diff>
--- a/Debugging_PPT.pptx
+++ b/Debugging_PPT.pptx
@@ -281,7 +281,7 @@
           <a:p>
             <a:fld id="{1160EA64-D806-43AC-9DF2-F8C432F32B4C}" type="datetimeFigureOut">
               <a:rPr lang="en-US" dirty="0"/>
-              <a:t>16-Jan-25</a:t>
+              <a:t>17-Jan-25</a:t>
             </a:fld>
             <a:endParaRPr lang="en-US" dirty="0"/>
           </a:p>
@@ -447,7 +447,7 @@
           <a:p>
             <a:fld id="{E9F9C37B-1D36-470B-8223-D6C91242EC14}" type="datetimeFigureOut">
               <a:rPr lang="en-US" dirty="0"/>
-              <a:t>16-Jan-25</a:t>
+              <a:t>17-Jan-25</a:t>
             </a:fld>
             <a:endParaRPr lang="en-US" dirty="0"/>
           </a:p>
@@ -622,7 +622,7 @@
           <a:p>
             <a:fld id="{67C6F52A-A82B-47A2-A83A-8C4C91F2D59F}" type="datetimeFigureOut">
               <a:rPr lang="en-US" dirty="0"/>
-              <a:t>16-Jan-25</a:t>
+              <a:t>17-Jan-25</a:t>
             </a:fld>
             <a:endParaRPr lang="en-US" dirty="0"/>
           </a:p>
@@ -787,7 +787,7 @@
           <a:p>
             <a:fld id="{F070A7B3-6521-4DCA-87E5-044747A908C1}" type="datetimeFigureOut">
               <a:rPr lang="en-US" dirty="0"/>
-              <a:t>16-Jan-25</a:t>
+              <a:t>17-Jan-25</a:t>
             </a:fld>
             <a:endParaRPr lang="en-US" dirty="0"/>
           </a:p>
@@ -1051,7 +1051,7 @@
           <a:p>
             <a:fld id="{1160EA64-D806-43AC-9DF2-F8C432F32B4C}" type="datetimeFigureOut">
               <a:rPr lang="en-US" dirty="0"/>
-              <a:t>16-Jan-25</a:t>
+              <a:t>17-Jan-25</a:t>
             </a:fld>
             <a:endParaRPr lang="en-US" dirty="0"/>
           </a:p>
@@ -1279,7 +1279,7 @@
           <a:p>
             <a:fld id="{AB134690-1557-4C89-A502-4959FE7FAD70}" type="datetimeFigureOut">
               <a:rPr lang="en-US" dirty="0"/>
-              <a:t>16-Jan-25</a:t>
+              <a:t>17-Jan-25</a:t>
             </a:fld>
             <a:endParaRPr lang="en-US" dirty="0"/>
           </a:p>
@@ -1633,7 +1633,7 @@
           <a:p>
             <a:fld id="{4F7D4976-E339-4826-83B7-FBD03F55ECF8}" type="datetimeFigureOut">
               <a:rPr lang="en-US" dirty="0"/>
-              <a:t>16-Jan-25</a:t>
+              <a:t>17-Jan-25</a:t>
             </a:fld>
             <a:endParaRPr lang="en-US" dirty="0"/>
           </a:p>
@@ -1769,7 +1769,7 @@
           <a:p>
             <a:fld id="{E1037C31-9E7A-4F99-8774-A0E530DE1A42}" type="datetimeFigureOut">
               <a:rPr lang="en-US" dirty="0"/>
-              <a:t>16-Jan-25</a:t>
+              <a:t>17-Jan-25</a:t>
             </a:fld>
             <a:endParaRPr lang="en-US" dirty="0"/>
           </a:p>
@@ -1859,7 +1859,7 @@
           <a:p>
             <a:fld id="{C278504F-A551-4DE0-9316-4DCD1D8CC752}" type="datetimeFigureOut">
               <a:rPr lang="en-US" dirty="0"/>
-              <a:t>16-Jan-25</a:t>
+              <a:t>17-Jan-25</a:t>
             </a:fld>
             <a:endParaRPr lang="en-US" dirty="0"/>
           </a:p>
@@ -2211,7 +2211,7 @@
           <a:p>
             <a:fld id="{D1BE4249-C0D0-4B06-8692-E8BB871AF643}" type="datetimeFigureOut">
               <a:rPr lang="en-US" dirty="0"/>
-              <a:t>16-Jan-25</a:t>
+              <a:t>17-Jan-25</a:t>
             </a:fld>
             <a:endParaRPr lang="en-US" dirty="0"/>
           </a:p>
@@ -2563,7 +2563,7 @@
           <a:p>
             <a:fld id="{042B0DB6-F5C7-45FB-8CF3-31B45F9C2DAC}" type="datetimeFigureOut">
               <a:rPr lang="en-US" dirty="0"/>
-              <a:t>16-Jan-25</a:t>
+              <a:t>17-Jan-25</a:t>
             </a:fld>
             <a:endParaRPr lang="en-US" dirty="0"/>
           </a:p>
@@ -2800,7 +2800,7 @@
           <a:p>
             <a:fld id="{1160EA64-D806-43AC-9DF2-F8C432F32B4C}" type="datetimeFigureOut">
               <a:rPr lang="en-US" dirty="0"/>
-              <a:t>16-Jan-25</a:t>
+              <a:t>17-Jan-25</a:t>
             </a:fld>
             <a:endParaRPr lang="en-US" dirty="0"/>
           </a:p>
@@ -3636,7 +3636,7 @@
           <a:p>
             <a:r>
               <a:rPr lang="en-US" dirty="0"/>
-              <a:t>30 points for correctly debugging the 7</a:t>
+              <a:t>40 points for correctly debugging the 7</a:t>
             </a:r>
             <a:r>
               <a:rPr lang="en-US" baseline="30000" dirty="0"/>
@@ -4344,12 +4344,12 @@
     <we:property name="MM-reminder" value="&quot;--&quot;"/>
     <we:property name="SS" value="0"/>
     <we:property name="SS-reminder" value="&quot;--&quot;"/>
-    <we:property name="canvash" value="495"/>
-    <we:property name="canvasw" value="495"/>
+    <we:property name="canvash" value="493"/>
+    <we:property name="canvasw" value="493"/>
     <we:property name="clocktype" value="&quot;digital&quot;"/>
     <we:property name="interval" value="5"/>
     <we:property name="isCountUp" value="false"/>
-    <we:property name="radius" value="222.75"/>
+    <we:property name="radius" value="221.85"/>
     <we:property name="showCombi" value="false"/>
     <we:property name="tickType" value="&quot;none&quot;"/>
     <we:property name="timeupType" value="&quot;none&quot;"/>

</xml_diff>